<commit_message>
working on lecture 7
</commit_message>
<xml_diff>
--- a/paper doodle/paper-summary-template.pptx
+++ b/paper doodle/paper-summary-template.pptx
@@ -1025,7 +1025,7 @@
           <a:p>
             <a:fld id="{2CA06878-74AD-CC4F-9BE4-06084354BA92}" type="datetimeFigureOut">
               <a:rPr lang="en-US" smtClean="0"/>
-              <a:t>6/4/2025</a:t>
+              <a:t>10/7/25</a:t>
             </a:fld>
             <a:endParaRPr lang="en-US"/>
           </a:p>
@@ -1505,7 +1505,7 @@
           <a:p>
             <a:fld id="{0BA5E0BF-F7D6-47BE-AD99-E90B4762431A}" type="datetimeFigureOut">
               <a:rPr lang="en-US" smtClean="0"/>
-              <a:t>6/4/2025</a:t>
+              <a:t>10/7/25</a:t>
             </a:fld>
             <a:endParaRPr lang="en-US"/>
           </a:p>
@@ -1673,7 +1673,7 @@
           <a:p>
             <a:fld id="{0BA5E0BF-F7D6-47BE-AD99-E90B4762431A}" type="datetimeFigureOut">
               <a:rPr lang="en-US" smtClean="0"/>
-              <a:t>6/4/2025</a:t>
+              <a:t>10/7/25</a:t>
             </a:fld>
             <a:endParaRPr lang="en-US"/>
           </a:p>
@@ -1851,7 +1851,7 @@
           <a:p>
             <a:fld id="{0BA5E0BF-F7D6-47BE-AD99-E90B4762431A}" type="datetimeFigureOut">
               <a:rPr lang="en-US" smtClean="0"/>
-              <a:t>6/4/2025</a:t>
+              <a:t>10/7/25</a:t>
             </a:fld>
             <a:endParaRPr lang="en-US"/>
           </a:p>
@@ -2019,7 +2019,7 @@
           <a:p>
             <a:fld id="{0BA5E0BF-F7D6-47BE-AD99-E90B4762431A}" type="datetimeFigureOut">
               <a:rPr lang="en-US" smtClean="0"/>
-              <a:t>6/4/2025</a:t>
+              <a:t>10/7/25</a:t>
             </a:fld>
             <a:endParaRPr lang="en-US"/>
           </a:p>
@@ -2262,7 +2262,7 @@
           <a:p>
             <a:fld id="{0BA5E0BF-F7D6-47BE-AD99-E90B4762431A}" type="datetimeFigureOut">
               <a:rPr lang="en-US" smtClean="0"/>
-              <a:t>6/4/2025</a:t>
+              <a:t>10/7/25</a:t>
             </a:fld>
             <a:endParaRPr lang="en-US"/>
           </a:p>
@@ -2491,7 +2491,7 @@
           <a:p>
             <a:fld id="{0BA5E0BF-F7D6-47BE-AD99-E90B4762431A}" type="datetimeFigureOut">
               <a:rPr lang="en-US" smtClean="0"/>
-              <a:t>6/4/2025</a:t>
+              <a:t>10/7/25</a:t>
             </a:fld>
             <a:endParaRPr lang="en-US"/>
           </a:p>
@@ -2855,7 +2855,7 @@
           <a:p>
             <a:fld id="{0BA5E0BF-F7D6-47BE-AD99-E90B4762431A}" type="datetimeFigureOut">
               <a:rPr lang="en-US" smtClean="0"/>
-              <a:t>6/4/2025</a:t>
+              <a:t>10/7/25</a:t>
             </a:fld>
             <a:endParaRPr lang="en-US"/>
           </a:p>
@@ -2972,7 +2972,7 @@
           <a:p>
             <a:fld id="{0BA5E0BF-F7D6-47BE-AD99-E90B4762431A}" type="datetimeFigureOut">
               <a:rPr lang="en-US" smtClean="0"/>
-              <a:t>6/4/2025</a:t>
+              <a:t>10/7/25</a:t>
             </a:fld>
             <a:endParaRPr lang="en-US"/>
           </a:p>
@@ -3067,7 +3067,7 @@
           <a:p>
             <a:fld id="{0BA5E0BF-F7D6-47BE-AD99-E90B4762431A}" type="datetimeFigureOut">
               <a:rPr lang="en-US" smtClean="0"/>
-              <a:t>6/4/2025</a:t>
+              <a:t>10/7/25</a:t>
             </a:fld>
             <a:endParaRPr lang="en-US"/>
           </a:p>
@@ -3342,7 +3342,7 @@
           <a:p>
             <a:fld id="{0BA5E0BF-F7D6-47BE-AD99-E90B4762431A}" type="datetimeFigureOut">
               <a:rPr lang="en-US" smtClean="0"/>
-              <a:t>6/4/2025</a:t>
+              <a:t>10/7/25</a:t>
             </a:fld>
             <a:endParaRPr lang="en-US"/>
           </a:p>
@@ -3597,7 +3597,7 @@
           <a:p>
             <a:fld id="{0BA5E0BF-F7D6-47BE-AD99-E90B4762431A}" type="datetimeFigureOut">
               <a:rPr lang="en-US" smtClean="0"/>
-              <a:t>6/4/2025</a:t>
+              <a:t>10/7/25</a:t>
             </a:fld>
             <a:endParaRPr lang="en-US"/>
           </a:p>
@@ -3808,7 +3808,7 @@
           <a:p>
             <a:fld id="{0BA5E0BF-F7D6-47BE-AD99-E90B4762431A}" type="datetimeFigureOut">
               <a:rPr lang="en-US" smtClean="0"/>
-              <a:t>6/4/2025</a:t>
+              <a:t>10/7/25</a:t>
             </a:fld>
             <a:endParaRPr lang="en-US"/>
           </a:p>
@@ -4243,8 +4243,13 @@
           <a:p>
             <a:r>
               <a:rPr lang="en-US" sz="2400" dirty="0"/>
-              <a:t>Creating Paper Annotations</a:t>
-            </a:r>
+              <a:t>Creating Paper Annotations - by Claire </a:t>
+            </a:r>
+            <a:r>
+              <a:rPr lang="en-US" sz="2400" dirty="0" err="1"/>
+              <a:t>Lamman</a:t>
+            </a:r>
+            <a:endParaRPr lang="en-US" sz="2400" dirty="0"/>
           </a:p>
         </p:txBody>
       </p:sp>
@@ -5110,8 +5115,8 @@
           </a:p>
         </p:txBody>
       </p:sp>
-      <mc:AlternateContent xmlns:mc="http://schemas.openxmlformats.org/markup-compatibility/2006">
-        <mc:Choice xmlns:p14="http://schemas.microsoft.com/office/powerpoint/2010/main" Requires="p14">
+      <mc:AlternateContent xmlns:mc="http://schemas.openxmlformats.org/markup-compatibility/2006" xmlns:p14="http://schemas.microsoft.com/office/powerpoint/2010/main">
+        <mc:Choice Requires="p14">
           <p:contentPart p14:bwMode="auto" r:id="rId5">
             <p14:nvContentPartPr>
               <p14:cNvPr id="50" name="Ink 49">
@@ -5130,7 +5135,7 @@
             </p14:xfrm>
           </p:contentPart>
         </mc:Choice>
-        <mc:Fallback>
+        <mc:Fallback xmlns="">
           <p:pic>
             <p:nvPicPr>
               <p:cNvPr id="50" name="Ink 49">
@@ -6220,8 +6225,8 @@
             </a:p>
           </p:txBody>
         </p:sp>
-        <mc:AlternateContent xmlns:mc="http://schemas.openxmlformats.org/markup-compatibility/2006">
-          <mc:Choice xmlns:p14="http://schemas.microsoft.com/office/powerpoint/2010/main" Requires="p14">
+        <mc:AlternateContent xmlns:mc="http://schemas.openxmlformats.org/markup-compatibility/2006" xmlns:p14="http://schemas.microsoft.com/office/powerpoint/2010/main">
+          <mc:Choice Requires="p14">
             <p:contentPart p14:bwMode="auto" r:id="rId16">
               <p14:nvContentPartPr>
                 <p14:cNvPr id="2" name="Ink 1">
@@ -6240,7 +6245,7 @@
               </p14:xfrm>
             </p:contentPart>
           </mc:Choice>
-          <mc:Fallback>
+          <mc:Fallback xmlns="">
             <p:pic>
               <p:nvPicPr>
                 <p:cNvPr id="2" name="Ink 1">
@@ -7510,8 +7515,8 @@
           </a:p>
         </p:txBody>
       </p:sp>
-      <mc:AlternateContent xmlns:mc="http://schemas.openxmlformats.org/markup-compatibility/2006">
-        <mc:Choice xmlns:p14="http://schemas.microsoft.com/office/powerpoint/2010/main" Requires="p14">
+      <mc:AlternateContent xmlns:mc="http://schemas.openxmlformats.org/markup-compatibility/2006" xmlns:p14="http://schemas.microsoft.com/office/powerpoint/2010/main">
+        <mc:Choice Requires="p14">
           <p:contentPart p14:bwMode="auto" r:id="rId5">
             <p14:nvContentPartPr>
               <p14:cNvPr id="18" name="Ink 17">
@@ -7530,7 +7535,7 @@
             </p14:xfrm>
           </p:contentPart>
         </mc:Choice>
-        <mc:Fallback>
+        <mc:Fallback xmlns="">
           <p:pic>
             <p:nvPicPr>
               <p:cNvPr id="18" name="Ink 17">
@@ -7610,8 +7615,8 @@
           </a:p>
         </p:txBody>
       </p:sp>
-      <mc:AlternateContent xmlns:mc="http://schemas.openxmlformats.org/markup-compatibility/2006">
-        <mc:Choice xmlns:p14="http://schemas.microsoft.com/office/powerpoint/2010/main" Requires="p14">
+      <mc:AlternateContent xmlns:mc="http://schemas.openxmlformats.org/markup-compatibility/2006" xmlns:p14="http://schemas.microsoft.com/office/powerpoint/2010/main">
+        <mc:Choice Requires="p14">
           <p:contentPart p14:bwMode="auto" r:id="rId7">
             <p14:nvContentPartPr>
               <p14:cNvPr id="79" name="Ink 78">
@@ -7630,7 +7635,7 @@
             </p14:xfrm>
           </p:contentPart>
         </mc:Choice>
-        <mc:Fallback>
+        <mc:Fallback xmlns="">
           <p:pic>
             <p:nvPicPr>
               <p:cNvPr id="79" name="Ink 78">
@@ -7661,8 +7666,8 @@
           </p:pic>
         </mc:Fallback>
       </mc:AlternateContent>
-      <mc:AlternateContent xmlns:mc="http://schemas.openxmlformats.org/markup-compatibility/2006">
-        <mc:Choice xmlns:p14="http://schemas.microsoft.com/office/powerpoint/2010/main" Requires="p14">
+      <mc:AlternateContent xmlns:mc="http://schemas.openxmlformats.org/markup-compatibility/2006" xmlns:p14="http://schemas.microsoft.com/office/powerpoint/2010/main">
+        <mc:Choice Requires="p14">
           <p:contentPart p14:bwMode="auto" r:id="rId9">
             <p14:nvContentPartPr>
               <p14:cNvPr id="81" name="Ink 80">
@@ -7681,7 +7686,7 @@
             </p14:xfrm>
           </p:contentPart>
         </mc:Choice>
-        <mc:Fallback>
+        <mc:Fallback xmlns="">
           <p:pic>
             <p:nvPicPr>
               <p:cNvPr id="81" name="Ink 80">
@@ -7712,8 +7717,8 @@
           </p:pic>
         </mc:Fallback>
       </mc:AlternateContent>
-      <mc:AlternateContent xmlns:mc="http://schemas.openxmlformats.org/markup-compatibility/2006">
-        <mc:Choice xmlns:p14="http://schemas.microsoft.com/office/powerpoint/2010/main" Requires="p14">
+      <mc:AlternateContent xmlns:mc="http://schemas.openxmlformats.org/markup-compatibility/2006" xmlns:p14="http://schemas.microsoft.com/office/powerpoint/2010/main">
+        <mc:Choice Requires="p14">
           <p:contentPart p14:bwMode="auto" r:id="rId11">
             <p14:nvContentPartPr>
               <p14:cNvPr id="82" name="Ink 81">
@@ -7732,7 +7737,7 @@
             </p14:xfrm>
           </p:contentPart>
         </mc:Choice>
-        <mc:Fallback>
+        <mc:Fallback xmlns="">
           <p:pic>
             <p:nvPicPr>
               <p:cNvPr id="82" name="Ink 81">
@@ -7763,8 +7768,8 @@
           </p:pic>
         </mc:Fallback>
       </mc:AlternateContent>
-      <mc:AlternateContent xmlns:mc="http://schemas.openxmlformats.org/markup-compatibility/2006">
-        <mc:Choice xmlns:p14="http://schemas.microsoft.com/office/powerpoint/2010/main" Requires="p14">
+      <mc:AlternateContent xmlns:mc="http://schemas.openxmlformats.org/markup-compatibility/2006" xmlns:p14="http://schemas.microsoft.com/office/powerpoint/2010/main">
+        <mc:Choice Requires="p14">
           <p:contentPart p14:bwMode="auto" r:id="rId12">
             <p14:nvContentPartPr>
               <p14:cNvPr id="83" name="Ink 82">
@@ -7783,7 +7788,7 @@
             </p14:xfrm>
           </p:contentPart>
         </mc:Choice>
-        <mc:Fallback>
+        <mc:Fallback xmlns="">
           <p:pic>
             <p:nvPicPr>
               <p:cNvPr id="83" name="Ink 82">
@@ -7834,8 +7839,8 @@
             <a:chExt cx="343080" cy="324360"/>
           </a:xfrm>
         </p:grpSpPr>
-        <mc:AlternateContent xmlns:mc="http://schemas.openxmlformats.org/markup-compatibility/2006">
-          <mc:Choice xmlns:p14="http://schemas.microsoft.com/office/powerpoint/2010/main" Requires="p14">
+        <mc:AlternateContent xmlns:mc="http://schemas.openxmlformats.org/markup-compatibility/2006" xmlns:p14="http://schemas.microsoft.com/office/powerpoint/2010/main">
+          <mc:Choice Requires="p14">
             <p:contentPart p14:bwMode="auto" r:id="rId14">
               <p14:nvContentPartPr>
                 <p14:cNvPr id="85" name="Ink 84">
@@ -7854,7 +7859,7 @@
               </p14:xfrm>
             </p:contentPart>
           </mc:Choice>
-          <mc:Fallback>
+          <mc:Fallback xmlns="">
             <p:pic>
               <p:nvPicPr>
                 <p:cNvPr id="85" name="Ink 84">
@@ -7885,8 +7890,8 @@
             </p:pic>
           </mc:Fallback>
         </mc:AlternateContent>
-        <mc:AlternateContent xmlns:mc="http://schemas.openxmlformats.org/markup-compatibility/2006">
-          <mc:Choice xmlns:p14="http://schemas.microsoft.com/office/powerpoint/2010/main" Requires="p14">
+        <mc:AlternateContent xmlns:mc="http://schemas.openxmlformats.org/markup-compatibility/2006" xmlns:p14="http://schemas.microsoft.com/office/powerpoint/2010/main">
+          <mc:Choice Requires="p14">
             <p:contentPart p14:bwMode="auto" r:id="rId16">
               <p14:nvContentPartPr>
                 <p14:cNvPr id="87" name="Ink 86">
@@ -7905,7 +7910,7 @@
               </p14:xfrm>
             </p:contentPart>
           </mc:Choice>
-          <mc:Fallback>
+          <mc:Fallback xmlns="">
             <p:pic>
               <p:nvPicPr>
                 <p:cNvPr id="87" name="Ink 86">
@@ -7936,8 +7941,8 @@
             </p:pic>
           </mc:Fallback>
         </mc:AlternateContent>
-        <mc:AlternateContent xmlns:mc="http://schemas.openxmlformats.org/markup-compatibility/2006">
-          <mc:Choice xmlns:p14="http://schemas.microsoft.com/office/powerpoint/2010/main" Requires="p14">
+        <mc:AlternateContent xmlns:mc="http://schemas.openxmlformats.org/markup-compatibility/2006" xmlns:p14="http://schemas.microsoft.com/office/powerpoint/2010/main">
+          <mc:Choice Requires="p14">
             <p:contentPart p14:bwMode="auto" r:id="rId18">
               <p14:nvContentPartPr>
                 <p14:cNvPr id="89" name="Ink 88">
@@ -7956,7 +7961,7 @@
               </p14:xfrm>
             </p:contentPart>
           </mc:Choice>
-          <mc:Fallback>
+          <mc:Fallback xmlns="">
             <p:pic>
               <p:nvPicPr>
                 <p:cNvPr id="89" name="Ink 88">
@@ -7987,8 +7992,8 @@
             </p:pic>
           </mc:Fallback>
         </mc:AlternateContent>
-        <mc:AlternateContent xmlns:mc="http://schemas.openxmlformats.org/markup-compatibility/2006">
-          <mc:Choice xmlns:p14="http://schemas.microsoft.com/office/powerpoint/2010/main" Requires="p14">
+        <mc:AlternateContent xmlns:mc="http://schemas.openxmlformats.org/markup-compatibility/2006" xmlns:p14="http://schemas.microsoft.com/office/powerpoint/2010/main">
+          <mc:Choice Requires="p14">
             <p:contentPart p14:bwMode="auto" r:id="rId20">
               <p14:nvContentPartPr>
                 <p14:cNvPr id="90" name="Ink 89">
@@ -8007,7 +8012,7 @@
               </p14:xfrm>
             </p:contentPart>
           </mc:Choice>
-          <mc:Fallback>
+          <mc:Fallback xmlns="">
             <p:pic>
               <p:nvPicPr>
                 <p:cNvPr id="90" name="Ink 89">
@@ -8187,8 +8192,8 @@
             <a:chExt cx="343080" cy="324360"/>
           </a:xfrm>
         </p:grpSpPr>
-        <mc:AlternateContent xmlns:mc="http://schemas.openxmlformats.org/markup-compatibility/2006">
-          <mc:Choice xmlns:p14="http://schemas.microsoft.com/office/powerpoint/2010/main" Requires="p14">
+        <mc:AlternateContent xmlns:mc="http://schemas.openxmlformats.org/markup-compatibility/2006" xmlns:p14="http://schemas.microsoft.com/office/powerpoint/2010/main">
+          <mc:Choice Requires="p14">
             <p:contentPart p14:bwMode="auto" r:id="rId22">
               <p14:nvContentPartPr>
                 <p14:cNvPr id="95" name="Ink 94">
@@ -8207,7 +8212,7 @@
               </p14:xfrm>
             </p:contentPart>
           </mc:Choice>
-          <mc:Fallback>
+          <mc:Fallback xmlns="">
             <p:pic>
               <p:nvPicPr>
                 <p:cNvPr id="95" name="Ink 94">
@@ -8238,8 +8243,8 @@
             </p:pic>
           </mc:Fallback>
         </mc:AlternateContent>
-        <mc:AlternateContent xmlns:mc="http://schemas.openxmlformats.org/markup-compatibility/2006">
-          <mc:Choice xmlns:p14="http://schemas.microsoft.com/office/powerpoint/2010/main" Requires="p14">
+        <mc:AlternateContent xmlns:mc="http://schemas.openxmlformats.org/markup-compatibility/2006" xmlns:p14="http://schemas.microsoft.com/office/powerpoint/2010/main">
+          <mc:Choice Requires="p14">
             <p:contentPart p14:bwMode="auto" r:id="rId23">
               <p14:nvContentPartPr>
                 <p14:cNvPr id="96" name="Ink 95">
@@ -8258,7 +8263,7 @@
               </p14:xfrm>
             </p:contentPart>
           </mc:Choice>
-          <mc:Fallback>
+          <mc:Fallback xmlns="">
             <p:pic>
               <p:nvPicPr>
                 <p:cNvPr id="96" name="Ink 95">
@@ -8289,8 +8294,8 @@
             </p:pic>
           </mc:Fallback>
         </mc:AlternateContent>
-        <mc:AlternateContent xmlns:mc="http://schemas.openxmlformats.org/markup-compatibility/2006">
-          <mc:Choice xmlns:p14="http://schemas.microsoft.com/office/powerpoint/2010/main" Requires="p14">
+        <mc:AlternateContent xmlns:mc="http://schemas.openxmlformats.org/markup-compatibility/2006" xmlns:p14="http://schemas.microsoft.com/office/powerpoint/2010/main">
+          <mc:Choice Requires="p14">
             <p:contentPart p14:bwMode="auto" r:id="rId24">
               <p14:nvContentPartPr>
                 <p14:cNvPr id="97" name="Ink 96">
@@ -8309,7 +8314,7 @@
               </p14:xfrm>
             </p:contentPart>
           </mc:Choice>
-          <mc:Fallback>
+          <mc:Fallback xmlns="">
             <p:pic>
               <p:nvPicPr>
                 <p:cNvPr id="97" name="Ink 96">
@@ -8340,8 +8345,8 @@
             </p:pic>
           </mc:Fallback>
         </mc:AlternateContent>
-        <mc:AlternateContent xmlns:mc="http://schemas.openxmlformats.org/markup-compatibility/2006">
-          <mc:Choice xmlns:p14="http://schemas.microsoft.com/office/powerpoint/2010/main" Requires="p14">
+        <mc:AlternateContent xmlns:mc="http://schemas.openxmlformats.org/markup-compatibility/2006" xmlns:p14="http://schemas.microsoft.com/office/powerpoint/2010/main">
+          <mc:Choice Requires="p14">
             <p:contentPart p14:bwMode="auto" r:id="rId25">
               <p14:nvContentPartPr>
                 <p14:cNvPr id="98" name="Ink 97">
@@ -8360,7 +8365,7 @@
               </p14:xfrm>
             </p:contentPart>
           </mc:Choice>
-          <mc:Fallback>
+          <mc:Fallback xmlns="">
             <p:pic>
               <p:nvPicPr>
                 <p:cNvPr id="98" name="Ink 97">
@@ -8962,6 +8967,15 @@
 </file>
 
 <file path=customXml/item1.xml><?xml version="1.0" encoding="utf-8"?>
+<?mso-contentType ?>
+<FormTemplates xmlns="http://schemas.microsoft.com/sharepoint/v3/contenttype/forms">
+  <Display>DocumentLibraryForm</Display>
+  <Edit>DocumentLibraryForm</Edit>
+  <New>DocumentLibraryForm</New>
+</FormTemplates>
+</file>
+
+<file path=customXml/item2.xml><?xml version="1.0" encoding="utf-8"?>
 <ct:contentTypeSchema xmlns:ct="http://schemas.microsoft.com/office/2006/metadata/contentType" xmlns:ma="http://schemas.microsoft.com/office/2006/metadata/properties/metaAttributes" ct:_="" ma:_="" ma:contentTypeName="Document" ma:contentTypeID="0x010100B354B93E15205145A38FDED7D04D7FAA" ma:contentTypeVersion="6" ma:contentTypeDescription="Create a new document." ma:contentTypeScope="" ma:versionID="08b785b8cf3f7775bffc6fd597f9dc55">
   <xsd:schema xmlns:xsd="http://www.w3.org/2001/XMLSchema" xmlns:xs="http://www.w3.org/2001/XMLSchema" xmlns:p="http://schemas.microsoft.com/office/2006/metadata/properties" xmlns:ns3="ad29064b-6dd6-4d50-81dd-dbc1f43e61b0" targetNamespace="http://schemas.microsoft.com/office/2006/metadata/properties" ma:root="true" ma:fieldsID="8cc2df313bcae487f023892535b06b6f" ns3:_="">
     <xsd:import namespace="ad29064b-6dd6-4d50-81dd-dbc1f43e61b0"/>
@@ -9119,15 +9133,6 @@
 </ct:contentTypeSchema>
 </file>
 
-<file path=customXml/item2.xml><?xml version="1.0" encoding="utf-8"?>
-<?mso-contentType ?>
-<FormTemplates xmlns="http://schemas.microsoft.com/sharepoint/v3/contenttype/forms">
-  <Display>DocumentLibraryForm</Display>
-  <Edit>DocumentLibraryForm</Edit>
-  <New>DocumentLibraryForm</New>
-</FormTemplates>
-</file>
-
 <file path=customXml/item3.xml><?xml version="1.0" encoding="utf-8"?>
 <p:properties xmlns:p="http://schemas.microsoft.com/office/2006/metadata/properties" xmlns:xsi="http://www.w3.org/2001/XMLSchema-instance" xmlns:pc="http://schemas.microsoft.com/office/infopath/2007/PartnerControls">
   <documentManagement/>
@@ -9135,6 +9140,14 @@
 </file>
 
 <file path=customXml/itemProps1.xml><?xml version="1.0" encoding="utf-8"?>
+<ds:datastoreItem xmlns:ds="http://schemas.openxmlformats.org/officeDocument/2006/customXml" ds:itemID="{75C98BE6-F8C5-400E-A249-2353C741A2F5}">
+  <ds:schemaRefs>
+    <ds:schemaRef ds:uri="http://schemas.microsoft.com/sharepoint/v3/contenttype/forms"/>
+  </ds:schemaRefs>
+</ds:datastoreItem>
+</file>
+
+<file path=customXml/itemProps2.xml><?xml version="1.0" encoding="utf-8"?>
 <ds:datastoreItem xmlns:ds="http://schemas.openxmlformats.org/officeDocument/2006/customXml" ds:itemID="{F41583AD-EF74-4D0F-82DC-B6619FF77C34}">
   <ds:schemaRefs>
     <ds:schemaRef ds:uri="ad29064b-6dd6-4d50-81dd-dbc1f43e61b0"/>
@@ -9149,14 +9162,6 @@
     <ds:schemaRef ds:uri="http://purl.org/dc/elements/1.1/"/>
     <ds:schemaRef ds:uri="http://purl.org/dc/terms/"/>
     <ds:schemaRef ds:uri="http://schemas.microsoft.com/internal/obd"/>
-  </ds:schemaRefs>
-</ds:datastoreItem>
-</file>
-
-<file path=customXml/itemProps2.xml><?xml version="1.0" encoding="utf-8"?>
-<ds:datastoreItem xmlns:ds="http://schemas.openxmlformats.org/officeDocument/2006/customXml" ds:itemID="{75C98BE6-F8C5-400E-A249-2353C741A2F5}">
-  <ds:schemaRefs>
-    <ds:schemaRef ds:uri="http://schemas.microsoft.com/sharepoint/v3/contenttype/forms"/>
   </ds:schemaRefs>
 </ds:datastoreItem>
 </file>

</xml_diff>